<commit_message>
Add simple chart data processing (and tests)
</commit_message>
<xml_diff>
--- a/template_reports/raw_templates/template.pptx
+++ b/template_reports/raw_templates/template.pptx
@@ -8,6 +8,7 @@
     <p:sldId id="256" r:id="rId2"/>
     <p:sldId id="257" r:id="rId3"/>
     <p:sldId id="258" r:id="rId4"/>
+    <p:sldId id="259" r:id="rId5"/>
   </p:sldIdLst>
   <p:sldSz cx="12192000" cy="6858000"/>
   <p:notesSz cx="6858000" cy="9144000"/>
@@ -114,6 +115,787 @@
 </p:presentation>
 </file>
 
+<file path=ppt/charts/chart1.xml><?xml version="1.0" encoding="utf-8"?>
+<c:chartSpace xmlns:c="http://schemas.openxmlformats.org/drawingml/2006/chart" xmlns:a="http://schemas.openxmlformats.org/drawingml/2006/main" xmlns:r="http://schemas.openxmlformats.org/officeDocument/2006/relationships" xmlns:c16r2="http://schemas.microsoft.com/office/drawing/2015/06/chart">
+  <c:date1904 val="0"/>
+  <c:lang val="en-US"/>
+  <c:roundedCorners val="0"/>
+  <mc:AlternateContent xmlns:mc="http://schemas.openxmlformats.org/markup-compatibility/2006">
+    <mc:Choice xmlns:c14="http://schemas.microsoft.com/office/drawing/2007/8/2/chart" Requires="c14">
+      <c14:style val="102"/>
+    </mc:Choice>
+    <mc:Fallback>
+      <c:style val="2"/>
+    </mc:Fallback>
+  </mc:AlternateContent>
+  <c:chart>
+    <c:title>
+      <c:overlay val="0"/>
+      <c:spPr>
+        <a:noFill/>
+        <a:ln>
+          <a:noFill/>
+        </a:ln>
+        <a:effectLst/>
+      </c:spPr>
+      <c:txPr>
+        <a:bodyPr rot="0" spcFirstLastPara="1" vertOverflow="ellipsis" vert="horz" wrap="square" anchor="ctr" anchorCtr="1"/>
+        <a:lstStyle/>
+        <a:p>
+          <a:pPr>
+            <a:defRPr sz="1862" b="0" i="0" u="none" strike="noStrike" kern="1200" spc="0" baseline="0">
+              <a:solidFill>
+                <a:schemeClr val="tx1">
+                  <a:lumMod val="65000"/>
+                  <a:lumOff val="35000"/>
+                </a:schemeClr>
+              </a:solidFill>
+              <a:latin typeface="+mn-lt"/>
+              <a:ea typeface="+mn-ea"/>
+              <a:cs typeface="+mn-cs"/>
+            </a:defRPr>
+          </a:pPr>
+          <a:endParaRPr lang="en-US"/>
+        </a:p>
+      </c:txPr>
+    </c:title>
+    <c:autoTitleDeleted val="0"/>
+    <c:plotArea>
+      <c:layout/>
+      <c:pieChart>
+        <c:varyColors val="1"/>
+        <c:ser>
+          <c:idx val="0"/>
+          <c:order val="0"/>
+          <c:tx>
+            <c:strRef>
+              <c:f>Sheet1!$B$1</c:f>
+              <c:strCache>
+                <c:ptCount val="1"/>
+                <c:pt idx="0">
+                  <c:v>{{user.name}}</c:v>
+                </c:pt>
+              </c:strCache>
+            </c:strRef>
+          </c:tx>
+          <c:dPt>
+            <c:idx val="0"/>
+            <c:bubble3D val="0"/>
+            <c:spPr>
+              <a:solidFill>
+                <a:schemeClr val="accent1"/>
+              </a:solidFill>
+              <a:ln w="19050">
+                <a:solidFill>
+                  <a:schemeClr val="lt1"/>
+                </a:solidFill>
+              </a:ln>
+              <a:effectLst/>
+            </c:spPr>
+            <c:extLst>
+              <c:ext xmlns:c16="http://schemas.microsoft.com/office/drawing/2014/chart" uri="{C3380CC4-5D6E-409C-BE32-E72D297353CC}">
+                <c16:uniqueId val="{00000001-2084-4B0C-9111-C734FD15A350}"/>
+              </c:ext>
+            </c:extLst>
+          </c:dPt>
+          <c:dPt>
+            <c:idx val="1"/>
+            <c:bubble3D val="0"/>
+            <c:spPr>
+              <a:solidFill>
+                <a:schemeClr val="accent2"/>
+              </a:solidFill>
+              <a:ln w="19050">
+                <a:solidFill>
+                  <a:schemeClr val="lt1"/>
+                </a:solidFill>
+              </a:ln>
+              <a:effectLst/>
+            </c:spPr>
+            <c:extLst>
+              <c:ext xmlns:c16="http://schemas.microsoft.com/office/drawing/2014/chart" uri="{C3380CC4-5D6E-409C-BE32-E72D297353CC}">
+                <c16:uniqueId val="{00000003-2084-4B0C-9111-C734FD15A350}"/>
+              </c:ext>
+            </c:extLst>
+          </c:dPt>
+          <c:cat>
+            <c:strRef>
+              <c:f>Sheet1!$A$2:$A$3</c:f>
+              <c:strCache>
+                <c:ptCount val="2"/>
+                <c:pt idx="0">
+                  <c:v>{{ user.cohort.name }}</c:v>
+                </c:pt>
+                <c:pt idx="1">
+                  <c:v>{{user.name}}</c:v>
+                </c:pt>
+              </c:strCache>
+            </c:strRef>
+          </c:cat>
+          <c:val>
+            <c:numRef>
+              <c:f>Sheet1!$B$2:$B$3</c:f>
+              <c:numCache>
+                <c:formatCode>General</c:formatCode>
+                <c:ptCount val="2"/>
+                <c:pt idx="0">
+                  <c:v>8.1999999999999993</c:v>
+                </c:pt>
+                <c:pt idx="1">
+                  <c:v>6</c:v>
+                </c:pt>
+              </c:numCache>
+            </c:numRef>
+          </c:val>
+          <c:extLst>
+            <c:ext xmlns:c16="http://schemas.microsoft.com/office/drawing/2014/chart" uri="{C3380CC4-5D6E-409C-BE32-E72D297353CC}">
+              <c16:uniqueId val="{00000000-017B-4AFB-AF93-41C4099C9995}"/>
+            </c:ext>
+          </c:extLst>
+        </c:ser>
+        <c:dLbls>
+          <c:showLegendKey val="0"/>
+          <c:showVal val="0"/>
+          <c:showCatName val="0"/>
+          <c:showSerName val="0"/>
+          <c:showPercent val="0"/>
+          <c:showBubbleSize val="0"/>
+          <c:showLeaderLines val="1"/>
+        </c:dLbls>
+        <c:firstSliceAng val="0"/>
+      </c:pieChart>
+      <c:spPr>
+        <a:noFill/>
+        <a:ln>
+          <a:noFill/>
+        </a:ln>
+        <a:effectLst/>
+      </c:spPr>
+    </c:plotArea>
+    <c:legend>
+      <c:legendPos val="b"/>
+      <c:overlay val="0"/>
+      <c:spPr>
+        <a:noFill/>
+        <a:ln>
+          <a:noFill/>
+        </a:ln>
+        <a:effectLst/>
+      </c:spPr>
+      <c:txPr>
+        <a:bodyPr rot="0" spcFirstLastPara="1" vertOverflow="ellipsis" vert="horz" wrap="square" anchor="ctr" anchorCtr="1"/>
+        <a:lstStyle/>
+        <a:p>
+          <a:pPr>
+            <a:defRPr sz="1197" b="0" i="0" u="none" strike="noStrike" kern="1200" baseline="0">
+              <a:solidFill>
+                <a:schemeClr val="tx1">
+                  <a:lumMod val="65000"/>
+                  <a:lumOff val="35000"/>
+                </a:schemeClr>
+              </a:solidFill>
+              <a:latin typeface="+mn-lt"/>
+              <a:ea typeface="+mn-ea"/>
+              <a:cs typeface="+mn-cs"/>
+            </a:defRPr>
+          </a:pPr>
+          <a:endParaRPr lang="en-US"/>
+        </a:p>
+      </c:txPr>
+    </c:legend>
+    <c:plotVisOnly val="1"/>
+    <c:dispBlanksAs val="gap"/>
+    <c:extLst>
+      <c:ext xmlns:c16r3="http://schemas.microsoft.com/office/drawing/2017/03/chart" uri="{56B9EC1D-385E-4148-901F-78D8002777C0}">
+        <c16r3:dataDisplayOptions16>
+          <c16r3:dispNaAsBlank val="1"/>
+        </c16r3:dataDisplayOptions16>
+      </c:ext>
+    </c:extLst>
+    <c:showDLblsOverMax val="0"/>
+  </c:chart>
+  <c:spPr>
+    <a:noFill/>
+    <a:ln>
+      <a:noFill/>
+    </a:ln>
+    <a:effectLst/>
+  </c:spPr>
+  <c:txPr>
+    <a:bodyPr/>
+    <a:lstStyle/>
+    <a:p>
+      <a:pPr>
+        <a:defRPr/>
+      </a:pPr>
+      <a:endParaRPr lang="en-US"/>
+    </a:p>
+  </c:txPr>
+  <c:externalData r:id="rId3">
+    <c:autoUpdate val="0"/>
+  </c:externalData>
+</c:chartSpace>
+</file>
+
+<file path=ppt/charts/colors1.xml><?xml version="1.0" encoding="utf-8"?>
+<cs:colorStyle xmlns:cs="http://schemas.microsoft.com/office/drawing/2012/chartStyle" xmlns:a="http://schemas.openxmlformats.org/drawingml/2006/main" meth="cycle" id="10">
+  <a:schemeClr val="accent1"/>
+  <a:schemeClr val="accent2"/>
+  <a:schemeClr val="accent3"/>
+  <a:schemeClr val="accent4"/>
+  <a:schemeClr val="accent5"/>
+  <a:schemeClr val="accent6"/>
+  <cs:variation/>
+  <cs:variation>
+    <a:lumMod val="60000"/>
+  </cs:variation>
+  <cs:variation>
+    <a:lumMod val="80000"/>
+    <a:lumOff val="20000"/>
+  </cs:variation>
+  <cs:variation>
+    <a:lumMod val="80000"/>
+  </cs:variation>
+  <cs:variation>
+    <a:lumMod val="60000"/>
+    <a:lumOff val="40000"/>
+  </cs:variation>
+  <cs:variation>
+    <a:lumMod val="50000"/>
+  </cs:variation>
+  <cs:variation>
+    <a:lumMod val="70000"/>
+    <a:lumOff val="30000"/>
+  </cs:variation>
+  <cs:variation>
+    <a:lumMod val="70000"/>
+  </cs:variation>
+  <cs:variation>
+    <a:lumMod val="50000"/>
+    <a:lumOff val="50000"/>
+  </cs:variation>
+</cs:colorStyle>
+</file>
+
+<file path=ppt/charts/style1.xml><?xml version="1.0" encoding="utf-8"?>
+<cs:chartStyle xmlns:cs="http://schemas.microsoft.com/office/drawing/2012/chartStyle" xmlns:a="http://schemas.openxmlformats.org/drawingml/2006/main" id="251">
+  <cs:axisTitle>
+    <cs:lnRef idx="0"/>
+    <cs:fillRef idx="0"/>
+    <cs:effectRef idx="0"/>
+    <cs:fontRef idx="minor">
+      <a:schemeClr val="tx1">
+        <a:lumMod val="65000"/>
+        <a:lumOff val="35000"/>
+      </a:schemeClr>
+    </cs:fontRef>
+    <cs:defRPr sz="1330" kern="1200"/>
+  </cs:axisTitle>
+  <cs:categoryAxis>
+    <cs:lnRef idx="0"/>
+    <cs:fillRef idx="0"/>
+    <cs:effectRef idx="0"/>
+    <cs:fontRef idx="minor">
+      <a:schemeClr val="tx1">
+        <a:lumMod val="65000"/>
+        <a:lumOff val="35000"/>
+      </a:schemeClr>
+    </cs:fontRef>
+    <cs:spPr>
+      <a:ln w="9525" cap="flat" cmpd="sng" algn="ctr">
+        <a:solidFill>
+          <a:schemeClr val="tx1">
+            <a:lumMod val="15000"/>
+            <a:lumOff val="85000"/>
+          </a:schemeClr>
+        </a:solidFill>
+        <a:round/>
+      </a:ln>
+    </cs:spPr>
+    <cs:defRPr sz="1197" kern="1200"/>
+  </cs:categoryAxis>
+  <cs:chartArea mods="allowNoFillOverride allowNoLineOverride">
+    <cs:lnRef idx="0"/>
+    <cs:fillRef idx="0"/>
+    <cs:effectRef idx="0"/>
+    <cs:fontRef idx="minor">
+      <a:schemeClr val="tx1"/>
+    </cs:fontRef>
+    <cs:spPr>
+      <a:solidFill>
+        <a:schemeClr val="bg1"/>
+      </a:solidFill>
+      <a:ln w="9525" cap="flat" cmpd="sng" algn="ctr">
+        <a:solidFill>
+          <a:schemeClr val="tx1">
+            <a:lumMod val="15000"/>
+            <a:lumOff val="85000"/>
+          </a:schemeClr>
+        </a:solidFill>
+        <a:round/>
+      </a:ln>
+    </cs:spPr>
+    <cs:defRPr sz="1197" kern="1200"/>
+  </cs:chartArea>
+  <cs:dataLabel>
+    <cs:lnRef idx="0"/>
+    <cs:fillRef idx="0"/>
+    <cs:effectRef idx="0"/>
+    <cs:fontRef idx="minor">
+      <a:schemeClr val="tx1">
+        <a:lumMod val="75000"/>
+        <a:lumOff val="25000"/>
+      </a:schemeClr>
+    </cs:fontRef>
+    <cs:defRPr sz="1197" kern="1200"/>
+  </cs:dataLabel>
+  <cs:dataLabelCallout>
+    <cs:lnRef idx="0"/>
+    <cs:fillRef idx="0"/>
+    <cs:effectRef idx="0"/>
+    <cs:fontRef idx="minor">
+      <a:schemeClr val="dk1">
+        <a:lumMod val="65000"/>
+        <a:lumOff val="35000"/>
+      </a:schemeClr>
+    </cs:fontRef>
+    <cs:spPr>
+      <a:solidFill>
+        <a:schemeClr val="lt1"/>
+      </a:solidFill>
+      <a:ln>
+        <a:solidFill>
+          <a:schemeClr val="dk1">
+            <a:lumMod val="25000"/>
+            <a:lumOff val="75000"/>
+          </a:schemeClr>
+        </a:solidFill>
+      </a:ln>
+    </cs:spPr>
+    <cs:defRPr sz="1197" kern="1200"/>
+    <cs:bodyPr rot="0" spcFirstLastPara="1" vertOverflow="clip" horzOverflow="clip" vert="horz" wrap="square" lIns="36576" tIns="18288" rIns="36576" bIns="18288" anchor="ctr" anchorCtr="1">
+      <a:spAutoFit/>
+    </cs:bodyPr>
+  </cs:dataLabelCallout>
+  <cs:dataPoint>
+    <cs:lnRef idx="0"/>
+    <cs:fillRef idx="1">
+      <cs:styleClr val="auto"/>
+    </cs:fillRef>
+    <cs:effectRef idx="0"/>
+    <cs:fontRef idx="minor">
+      <a:schemeClr val="tx1"/>
+    </cs:fontRef>
+    <cs:spPr>
+      <a:ln w="19050">
+        <a:solidFill>
+          <a:schemeClr val="lt1"/>
+        </a:solidFill>
+      </a:ln>
+    </cs:spPr>
+  </cs:dataPoint>
+  <cs:dataPoint3D>
+    <cs:lnRef idx="0"/>
+    <cs:fillRef idx="1">
+      <cs:styleClr val="auto"/>
+    </cs:fillRef>
+    <cs:effectRef idx="0"/>
+    <cs:fontRef idx="minor">
+      <a:schemeClr val="tx1"/>
+    </cs:fontRef>
+    <cs:spPr>
+      <a:ln w="25400">
+        <a:solidFill>
+          <a:schemeClr val="lt1"/>
+        </a:solidFill>
+      </a:ln>
+    </cs:spPr>
+  </cs:dataPoint3D>
+  <cs:dataPointLine>
+    <cs:lnRef idx="0">
+      <cs:styleClr val="auto"/>
+    </cs:lnRef>
+    <cs:fillRef idx="0"/>
+    <cs:effectRef idx="0"/>
+    <cs:fontRef idx="minor">
+      <a:schemeClr val="tx1"/>
+    </cs:fontRef>
+    <cs:spPr>
+      <a:ln w="28575" cap="rnd">
+        <a:solidFill>
+          <a:schemeClr val="phClr"/>
+        </a:solidFill>
+        <a:round/>
+      </a:ln>
+    </cs:spPr>
+  </cs:dataPointLine>
+  <cs:dataPointMarker>
+    <cs:lnRef idx="0">
+      <cs:styleClr val="auto"/>
+    </cs:lnRef>
+    <cs:fillRef idx="1">
+      <cs:styleClr val="auto"/>
+    </cs:fillRef>
+    <cs:effectRef idx="0"/>
+    <cs:fontRef idx="minor">
+      <a:schemeClr val="tx1"/>
+    </cs:fontRef>
+    <cs:spPr>
+      <a:ln w="9525">
+        <a:solidFill>
+          <a:schemeClr val="phClr"/>
+        </a:solidFill>
+      </a:ln>
+    </cs:spPr>
+  </cs:dataPointMarker>
+  <cs:dataPointMarkerLayout symbol="circle" size="5"/>
+  <cs:dataPointWireframe>
+    <cs:lnRef idx="0">
+      <cs:styleClr val="auto"/>
+    </cs:lnRef>
+    <cs:fillRef idx="0"/>
+    <cs:effectRef idx="0"/>
+    <cs:fontRef idx="minor">
+      <a:schemeClr val="tx1"/>
+    </cs:fontRef>
+    <cs:spPr>
+      <a:ln w="9525" cap="rnd">
+        <a:solidFill>
+          <a:schemeClr val="phClr"/>
+        </a:solidFill>
+        <a:round/>
+      </a:ln>
+    </cs:spPr>
+  </cs:dataPointWireframe>
+  <cs:dataTable>
+    <cs:lnRef idx="0"/>
+    <cs:fillRef idx="0"/>
+    <cs:effectRef idx="0"/>
+    <cs:fontRef idx="minor">
+      <a:schemeClr val="tx1">
+        <a:lumMod val="65000"/>
+        <a:lumOff val="35000"/>
+      </a:schemeClr>
+    </cs:fontRef>
+    <cs:spPr>
+      <a:noFill/>
+      <a:ln w="9525" cap="flat" cmpd="sng" algn="ctr">
+        <a:solidFill>
+          <a:schemeClr val="tx1">
+            <a:lumMod val="15000"/>
+            <a:lumOff val="85000"/>
+          </a:schemeClr>
+        </a:solidFill>
+        <a:round/>
+      </a:ln>
+    </cs:spPr>
+    <cs:defRPr sz="1197" kern="1200"/>
+  </cs:dataTable>
+  <cs:downBar>
+    <cs:lnRef idx="0"/>
+    <cs:fillRef idx="0"/>
+    <cs:effectRef idx="0"/>
+    <cs:fontRef idx="minor">
+      <a:schemeClr val="tx1"/>
+    </cs:fontRef>
+    <cs:spPr>
+      <a:solidFill>
+        <a:schemeClr val="dk1">
+          <a:lumMod val="75000"/>
+          <a:lumOff val="25000"/>
+        </a:schemeClr>
+      </a:solidFill>
+      <a:ln w="9525" cap="flat" cmpd="sng" algn="ctr">
+        <a:solidFill>
+          <a:schemeClr val="tx1">
+            <a:lumMod val="65000"/>
+            <a:lumOff val="35000"/>
+          </a:schemeClr>
+        </a:solidFill>
+        <a:round/>
+      </a:ln>
+    </cs:spPr>
+  </cs:downBar>
+  <cs:dropLine>
+    <cs:lnRef idx="0"/>
+    <cs:fillRef idx="0"/>
+    <cs:effectRef idx="0"/>
+    <cs:fontRef idx="minor">
+      <a:schemeClr val="tx1"/>
+    </cs:fontRef>
+    <cs:spPr>
+      <a:ln w="9525" cap="flat" cmpd="sng" algn="ctr">
+        <a:solidFill>
+          <a:schemeClr val="tx1">
+            <a:lumMod val="35000"/>
+            <a:lumOff val="65000"/>
+          </a:schemeClr>
+        </a:solidFill>
+        <a:round/>
+      </a:ln>
+    </cs:spPr>
+  </cs:dropLine>
+  <cs:errorBar>
+    <cs:lnRef idx="0"/>
+    <cs:fillRef idx="0"/>
+    <cs:effectRef idx="0"/>
+    <cs:fontRef idx="minor">
+      <a:schemeClr val="tx1"/>
+    </cs:fontRef>
+    <cs:spPr>
+      <a:ln w="9525" cap="flat" cmpd="sng" algn="ctr">
+        <a:solidFill>
+          <a:schemeClr val="tx1">
+            <a:lumMod val="65000"/>
+            <a:lumOff val="35000"/>
+          </a:schemeClr>
+        </a:solidFill>
+        <a:round/>
+      </a:ln>
+    </cs:spPr>
+  </cs:errorBar>
+  <cs:floor>
+    <cs:lnRef idx="0"/>
+    <cs:fillRef idx="0"/>
+    <cs:effectRef idx="0"/>
+    <cs:fontRef idx="minor">
+      <a:schemeClr val="tx1"/>
+    </cs:fontRef>
+    <cs:spPr>
+      <a:noFill/>
+      <a:ln>
+        <a:noFill/>
+      </a:ln>
+    </cs:spPr>
+  </cs:floor>
+  <cs:gridlineMajor>
+    <cs:lnRef idx="0"/>
+    <cs:fillRef idx="0"/>
+    <cs:effectRef idx="0"/>
+    <cs:fontRef idx="minor">
+      <a:schemeClr val="tx1"/>
+    </cs:fontRef>
+    <cs:spPr>
+      <a:ln w="9525" cap="flat" cmpd="sng" algn="ctr">
+        <a:solidFill>
+          <a:schemeClr val="tx1">
+            <a:lumMod val="15000"/>
+            <a:lumOff val="85000"/>
+          </a:schemeClr>
+        </a:solidFill>
+        <a:round/>
+      </a:ln>
+    </cs:spPr>
+  </cs:gridlineMajor>
+  <cs:gridlineMinor>
+    <cs:lnRef idx="0"/>
+    <cs:fillRef idx="0"/>
+    <cs:effectRef idx="0"/>
+    <cs:fontRef idx="minor">
+      <a:schemeClr val="tx1"/>
+    </cs:fontRef>
+    <cs:spPr>
+      <a:ln w="9525" cap="flat" cmpd="sng" algn="ctr">
+        <a:solidFill>
+          <a:schemeClr val="tx1">
+            <a:lumMod val="5000"/>
+            <a:lumOff val="95000"/>
+          </a:schemeClr>
+        </a:solidFill>
+        <a:round/>
+      </a:ln>
+    </cs:spPr>
+  </cs:gridlineMinor>
+  <cs:hiLoLine>
+    <cs:lnRef idx="0"/>
+    <cs:fillRef idx="0"/>
+    <cs:effectRef idx="0"/>
+    <cs:fontRef idx="minor">
+      <a:schemeClr val="tx1"/>
+    </cs:fontRef>
+    <cs:spPr>
+      <a:ln w="9525" cap="flat" cmpd="sng" algn="ctr">
+        <a:solidFill>
+          <a:schemeClr val="tx1">
+            <a:lumMod val="50000"/>
+            <a:lumOff val="50000"/>
+          </a:schemeClr>
+        </a:solidFill>
+        <a:round/>
+      </a:ln>
+    </cs:spPr>
+  </cs:hiLoLine>
+  <cs:leaderLine>
+    <cs:lnRef idx="0"/>
+    <cs:fillRef idx="0"/>
+    <cs:effectRef idx="0"/>
+    <cs:fontRef idx="minor">
+      <a:schemeClr val="tx1"/>
+    </cs:fontRef>
+    <cs:spPr>
+      <a:ln w="9525" cap="flat" cmpd="sng" algn="ctr">
+        <a:solidFill>
+          <a:schemeClr val="tx1">
+            <a:lumMod val="35000"/>
+            <a:lumOff val="65000"/>
+          </a:schemeClr>
+        </a:solidFill>
+        <a:round/>
+      </a:ln>
+    </cs:spPr>
+  </cs:leaderLine>
+  <cs:legend>
+    <cs:lnRef idx="0"/>
+    <cs:fillRef idx="0"/>
+    <cs:effectRef idx="0"/>
+    <cs:fontRef idx="minor">
+      <a:schemeClr val="tx1">
+        <a:lumMod val="65000"/>
+        <a:lumOff val="35000"/>
+      </a:schemeClr>
+    </cs:fontRef>
+    <cs:defRPr sz="1197" kern="1200"/>
+  </cs:legend>
+  <cs:plotArea mods="allowNoFillOverride allowNoLineOverride">
+    <cs:lnRef idx="0"/>
+    <cs:fillRef idx="0"/>
+    <cs:effectRef idx="0"/>
+    <cs:fontRef idx="minor">
+      <a:schemeClr val="tx1"/>
+    </cs:fontRef>
+  </cs:plotArea>
+  <cs:plotArea3D mods="allowNoFillOverride allowNoLineOverride">
+    <cs:lnRef idx="0"/>
+    <cs:fillRef idx="0"/>
+    <cs:effectRef idx="0"/>
+    <cs:fontRef idx="minor">
+      <a:schemeClr val="tx1"/>
+    </cs:fontRef>
+  </cs:plotArea3D>
+  <cs:seriesAxis>
+    <cs:lnRef idx="0"/>
+    <cs:fillRef idx="0"/>
+    <cs:effectRef idx="0"/>
+    <cs:fontRef idx="minor">
+      <a:schemeClr val="tx1">
+        <a:lumMod val="65000"/>
+        <a:lumOff val="35000"/>
+      </a:schemeClr>
+    </cs:fontRef>
+    <cs:defRPr sz="1197" kern="1200"/>
+  </cs:seriesAxis>
+  <cs:seriesLine>
+    <cs:lnRef idx="0"/>
+    <cs:fillRef idx="0"/>
+    <cs:effectRef idx="0"/>
+    <cs:fontRef idx="minor">
+      <a:schemeClr val="tx1"/>
+    </cs:fontRef>
+    <cs:spPr>
+      <a:ln w="9525" cap="flat" cmpd="sng" algn="ctr">
+        <a:solidFill>
+          <a:schemeClr val="tx1">
+            <a:lumMod val="35000"/>
+            <a:lumOff val="65000"/>
+          </a:schemeClr>
+        </a:solidFill>
+        <a:round/>
+      </a:ln>
+    </cs:spPr>
+  </cs:seriesLine>
+  <cs:title>
+    <cs:lnRef idx="0"/>
+    <cs:fillRef idx="0"/>
+    <cs:effectRef idx="0"/>
+    <cs:fontRef idx="minor">
+      <a:schemeClr val="tx1">
+        <a:lumMod val="65000"/>
+        <a:lumOff val="35000"/>
+      </a:schemeClr>
+    </cs:fontRef>
+    <cs:defRPr sz="1862" b="0" kern="1200" spc="0" baseline="0"/>
+  </cs:title>
+  <cs:trendline>
+    <cs:lnRef idx="0">
+      <cs:styleClr val="auto"/>
+    </cs:lnRef>
+    <cs:fillRef idx="0"/>
+    <cs:effectRef idx="0"/>
+    <cs:fontRef idx="minor">
+      <a:schemeClr val="tx1"/>
+    </cs:fontRef>
+    <cs:spPr>
+      <a:ln w="19050" cap="rnd">
+        <a:solidFill>
+          <a:schemeClr val="phClr"/>
+        </a:solidFill>
+        <a:prstDash val="sysDot"/>
+      </a:ln>
+    </cs:spPr>
+  </cs:trendline>
+  <cs:trendlineLabel>
+    <cs:lnRef idx="0"/>
+    <cs:fillRef idx="0"/>
+    <cs:effectRef idx="0"/>
+    <cs:fontRef idx="minor">
+      <a:schemeClr val="tx1">
+        <a:lumMod val="65000"/>
+        <a:lumOff val="35000"/>
+      </a:schemeClr>
+    </cs:fontRef>
+    <cs:defRPr sz="1197" kern="1200"/>
+  </cs:trendlineLabel>
+  <cs:upBar>
+    <cs:lnRef idx="0"/>
+    <cs:fillRef idx="0"/>
+    <cs:effectRef idx="0"/>
+    <cs:fontRef idx="minor">
+      <a:schemeClr val="tx1"/>
+    </cs:fontRef>
+    <cs:spPr>
+      <a:solidFill>
+        <a:schemeClr val="lt1"/>
+      </a:solidFill>
+      <a:ln w="9525" cap="flat" cmpd="sng" algn="ctr">
+        <a:solidFill>
+          <a:schemeClr val="tx1">
+            <a:lumMod val="65000"/>
+            <a:lumOff val="35000"/>
+          </a:schemeClr>
+        </a:solidFill>
+        <a:round/>
+      </a:ln>
+    </cs:spPr>
+  </cs:upBar>
+  <cs:valueAxis>
+    <cs:lnRef idx="0"/>
+    <cs:fillRef idx="0"/>
+    <cs:effectRef idx="0"/>
+    <cs:fontRef idx="minor">
+      <a:schemeClr val="tx1">
+        <a:lumMod val="65000"/>
+        <a:lumOff val="35000"/>
+      </a:schemeClr>
+    </cs:fontRef>
+    <cs:defRPr sz="1197" kern="1200"/>
+  </cs:valueAxis>
+  <cs:wall>
+    <cs:lnRef idx="0"/>
+    <cs:fillRef idx="0"/>
+    <cs:effectRef idx="0"/>
+    <cs:fontRef idx="minor">
+      <a:schemeClr val="tx1"/>
+    </cs:fontRef>
+    <cs:spPr>
+      <a:noFill/>
+      <a:ln>
+        <a:noFill/>
+      </a:ln>
+    </cs:spPr>
+  </cs:wall>
+</cs:chartStyle>
+</file>
+
 <file path=ppt/slideLayouts/slideLayout1.xml><?xml version="1.0" encoding="utf-8"?>
 <p:sldLayout xmlns:a="http://schemas.openxmlformats.org/drawingml/2006/main" xmlns:r="http://schemas.openxmlformats.org/officeDocument/2006/relationships" xmlns:p="http://schemas.openxmlformats.org/presentationml/2006/main" type="title" preserve="1">
   <p:cSld name="Title Slide">
@@ -261,7 +1043,7 @@
           <a:p>
             <a:fld id="{8427D8FB-80AB-4B65-A20D-AFAA152C1E96}" type="datetimeFigureOut">
               <a:rPr lang="en-US" smtClean="0"/>
-              <a:t>2/18/2025</a:t>
+              <a:t>2/24/2025</a:t>
             </a:fld>
             <a:endParaRPr lang="en-US"/>
           </a:p>
@@ -459,7 +1241,7 @@
           <a:p>
             <a:fld id="{8427D8FB-80AB-4B65-A20D-AFAA152C1E96}" type="datetimeFigureOut">
               <a:rPr lang="en-US" smtClean="0"/>
-              <a:t>2/18/2025</a:t>
+              <a:t>2/24/2025</a:t>
             </a:fld>
             <a:endParaRPr lang="en-US"/>
           </a:p>
@@ -667,7 +1449,7 @@
           <a:p>
             <a:fld id="{8427D8FB-80AB-4B65-A20D-AFAA152C1E96}" type="datetimeFigureOut">
               <a:rPr lang="en-US" smtClean="0"/>
-              <a:t>2/18/2025</a:t>
+              <a:t>2/24/2025</a:t>
             </a:fld>
             <a:endParaRPr lang="en-US"/>
           </a:p>
@@ -865,7 +1647,7 @@
           <a:p>
             <a:fld id="{8427D8FB-80AB-4B65-A20D-AFAA152C1E96}" type="datetimeFigureOut">
               <a:rPr lang="en-US" smtClean="0"/>
-              <a:t>2/18/2025</a:t>
+              <a:t>2/24/2025</a:t>
             </a:fld>
             <a:endParaRPr lang="en-US"/>
           </a:p>
@@ -1140,7 +1922,7 @@
           <a:p>
             <a:fld id="{8427D8FB-80AB-4B65-A20D-AFAA152C1E96}" type="datetimeFigureOut">
               <a:rPr lang="en-US" smtClean="0"/>
-              <a:t>2/18/2025</a:t>
+              <a:t>2/24/2025</a:t>
             </a:fld>
             <a:endParaRPr lang="en-US"/>
           </a:p>
@@ -1405,7 +2187,7 @@
           <a:p>
             <a:fld id="{8427D8FB-80AB-4B65-A20D-AFAA152C1E96}" type="datetimeFigureOut">
               <a:rPr lang="en-US" smtClean="0"/>
-              <a:t>2/18/2025</a:t>
+              <a:t>2/24/2025</a:t>
             </a:fld>
             <a:endParaRPr lang="en-US"/>
           </a:p>
@@ -1817,7 +2599,7 @@
           <a:p>
             <a:fld id="{8427D8FB-80AB-4B65-A20D-AFAA152C1E96}" type="datetimeFigureOut">
               <a:rPr lang="en-US" smtClean="0"/>
-              <a:t>2/18/2025</a:t>
+              <a:t>2/24/2025</a:t>
             </a:fld>
             <a:endParaRPr lang="en-US"/>
           </a:p>
@@ -1958,7 +2740,7 @@
           <a:p>
             <a:fld id="{8427D8FB-80AB-4B65-A20D-AFAA152C1E96}" type="datetimeFigureOut">
               <a:rPr lang="en-US" smtClean="0"/>
-              <a:t>2/18/2025</a:t>
+              <a:t>2/24/2025</a:t>
             </a:fld>
             <a:endParaRPr lang="en-US"/>
           </a:p>
@@ -2071,7 +2853,7 @@
           <a:p>
             <a:fld id="{8427D8FB-80AB-4B65-A20D-AFAA152C1E96}" type="datetimeFigureOut">
               <a:rPr lang="en-US" smtClean="0"/>
-              <a:t>2/18/2025</a:t>
+              <a:t>2/24/2025</a:t>
             </a:fld>
             <a:endParaRPr lang="en-US"/>
           </a:p>
@@ -2382,7 +3164,7 @@
           <a:p>
             <a:fld id="{8427D8FB-80AB-4B65-A20D-AFAA152C1E96}" type="datetimeFigureOut">
               <a:rPr lang="en-US" smtClean="0"/>
-              <a:t>2/18/2025</a:t>
+              <a:t>2/24/2025</a:t>
             </a:fld>
             <a:endParaRPr lang="en-US"/>
           </a:p>
@@ -2670,7 +3452,7 @@
           <a:p>
             <a:fld id="{8427D8FB-80AB-4B65-A20D-AFAA152C1E96}" type="datetimeFigureOut">
               <a:rPr lang="en-US" smtClean="0"/>
-              <a:t>2/18/2025</a:t>
+              <a:t>2/24/2025</a:t>
             </a:fld>
             <a:endParaRPr lang="en-US"/>
           </a:p>
@@ -2911,7 +3693,7 @@
           <a:p>
             <a:fld id="{8427D8FB-80AB-4B65-A20D-AFAA152C1E96}" type="datetimeFigureOut">
               <a:rPr lang="en-US" smtClean="0"/>
-              <a:t>2/18/2025</a:t>
+              <a:t>2/24/2025</a:t>
             </a:fld>
             <a:endParaRPr lang="en-US"/>
           </a:p>
@@ -3738,20 +4520,12 @@
               <a:t>bob@test.com,is_active</a:t>
             </a:r>
             <a:r>
-              <a:rPr lang="en-US" b="1">
-                <a:latin typeface="Calibri" panose="020F0502020204030204" pitchFamily="34" charset="0"/>
-                <a:ea typeface="Calibri" panose="020F0502020204030204" pitchFamily="34" charset="0"/>
-                <a:cs typeface="Calibri" panose="020F0502020204030204" pitchFamily="34" charset="0"/>
-              </a:rPr>
-              <a:t>=True].</a:t>
-            </a:r>
-            <a:r>
               <a:rPr lang="en-US" b="1" dirty="0">
                 <a:latin typeface="Calibri" panose="020F0502020204030204" pitchFamily="34" charset="0"/>
                 <a:ea typeface="Calibri" panose="020F0502020204030204" pitchFamily="34" charset="0"/>
                 <a:cs typeface="Calibri" panose="020F0502020204030204" pitchFamily="34" charset="0"/>
               </a:rPr>
-              <a:t>email }}</a:t>
+              <a:t>=True].email }}</a:t>
             </a:r>
           </a:p>
           <a:p>
@@ -3941,6 +4715,92 @@
     <p:extLst>
       <p:ext uri="{BB962C8B-B14F-4D97-AF65-F5344CB8AC3E}">
         <p14:creationId xmlns:p14="http://schemas.microsoft.com/office/powerpoint/2010/main" val="4269737172"/>
+      </p:ext>
+    </p:extLst>
+  </p:cSld>
+  <p:clrMapOvr>
+    <a:masterClrMapping/>
+  </p:clrMapOvr>
+</p:sld>
+</file>
+
+<file path=ppt/slides/slide4.xml><?xml version="1.0" encoding="utf-8"?>
+<p:sld xmlns:a="http://schemas.openxmlformats.org/drawingml/2006/main" xmlns:r="http://schemas.openxmlformats.org/officeDocument/2006/relationships" xmlns:p="http://schemas.openxmlformats.org/presentationml/2006/main">
+  <p:cSld>
+    <p:spTree>
+      <p:nvGrpSpPr>
+        <p:cNvPr id="1" name=""/>
+        <p:cNvGrpSpPr/>
+        <p:nvPr/>
+      </p:nvGrpSpPr>
+      <p:grpSpPr>
+        <a:xfrm>
+          <a:off x="0" y="0"/>
+          <a:ext cx="0" cy="0"/>
+          <a:chOff x="0" y="0"/>
+          <a:chExt cx="0" cy="0"/>
+        </a:xfrm>
+      </p:grpSpPr>
+      <p:sp>
+        <p:nvSpPr>
+          <p:cNvPr id="2" name="Title 1">
+            <a:extLst>
+              <a:ext uri="{FF2B5EF4-FFF2-40B4-BE49-F238E27FC236}">
+                <a16:creationId xmlns:a16="http://schemas.microsoft.com/office/drawing/2014/main" id="{56AE4B76-63D3-92A9-E398-06F35E52A314}"/>
+              </a:ext>
+            </a:extLst>
+          </p:cNvPr>
+          <p:cNvSpPr>
+            <a:spLocks noGrp="1"/>
+          </p:cNvSpPr>
+          <p:nvPr>
+            <p:ph type="title"/>
+          </p:nvPr>
+        </p:nvSpPr>
+        <p:spPr/>
+        <p:txBody>
+          <a:bodyPr/>
+          <a:lstStyle/>
+          <a:p>
+            <a:endParaRPr lang="en-US"/>
+          </a:p>
+        </p:txBody>
+      </p:sp>
+      <p:graphicFrame>
+        <p:nvGraphicFramePr>
+          <p:cNvPr id="6" name="Content Placeholder 5">
+            <a:extLst>
+              <a:ext uri="{FF2B5EF4-FFF2-40B4-BE49-F238E27FC236}">
+                <a16:creationId xmlns:a16="http://schemas.microsoft.com/office/drawing/2014/main" id="{5353F08A-E1AE-819D-3357-3D39DE3F747E}"/>
+              </a:ext>
+            </a:extLst>
+          </p:cNvPr>
+          <p:cNvGraphicFramePr>
+            <a:graphicFrameLocks noGrp="1"/>
+          </p:cNvGraphicFramePr>
+          <p:nvPr>
+            <p:ph idx="1"/>
+            <p:extLst>
+              <p:ext uri="{D42A27DB-BD31-4B8C-83A1-F6EECF244321}">
+                <p14:modId xmlns:p14="http://schemas.microsoft.com/office/powerpoint/2010/main" val="3900488310"/>
+              </p:ext>
+            </p:extLst>
+          </p:nvPr>
+        </p:nvGraphicFramePr>
+        <p:xfrm>
+          <a:off x="838200" y="1825625"/>
+          <a:ext cx="10515600" cy="4351338"/>
+        </p:xfrm>
+        <a:graphic>
+          <a:graphicData uri="http://schemas.openxmlformats.org/drawingml/2006/chart">
+            <c:chart xmlns:c="http://schemas.openxmlformats.org/drawingml/2006/chart" xmlns:r="http://schemas.openxmlformats.org/officeDocument/2006/relationships" r:id="rId2"/>
+          </a:graphicData>
+        </a:graphic>
+      </p:graphicFrame>
+    </p:spTree>
+    <p:extLst>
+      <p:ext uri="{BB962C8B-B14F-4D97-AF65-F5344CB8AC3E}">
+        <p14:creationId xmlns:p14="http://schemas.microsoft.com/office/powerpoint/2010/main" val="2556015998"/>
       </p:ext>
     </p:extLst>
   </p:cSld>

</xml_diff>

<commit_message>
Documentation/tweaks to text formatting
</commit_message>
<xml_diff>
--- a/template_reports/raw_templates/template.pptx
+++ b/template_reports/raw_templates/template.pptx
@@ -8,7 +8,8 @@
     <p:sldId id="256" r:id="rId2"/>
     <p:sldId id="257" r:id="rId3"/>
     <p:sldId id="258" r:id="rId4"/>
-    <p:sldId id="259" r:id="rId5"/>
+    <p:sldId id="260" r:id="rId5"/>
+    <p:sldId id="259" r:id="rId6"/>
   </p:sldIdLst>
   <p:sldSz cx="12192000" cy="6858000"/>
   <p:notesSz cx="6858000" cy="9144000"/>
@@ -4729,6 +4730,263 @@
   <p:cSld>
     <p:spTree>
       <p:nvGrpSpPr>
+        <p:cNvPr id="1" name="">
+          <a:extLst>
+            <a:ext uri="{FF2B5EF4-FFF2-40B4-BE49-F238E27FC236}">
+              <a16:creationId xmlns:a16="http://schemas.microsoft.com/office/drawing/2014/main" id="{974ADF19-519C-2767-E677-C6575FD9808E}"/>
+            </a:ext>
+          </a:extLst>
+        </p:cNvPr>
+        <p:cNvGrpSpPr/>
+        <p:nvPr/>
+      </p:nvGrpSpPr>
+      <p:grpSpPr>
+        <a:xfrm>
+          <a:off x="0" y="0"/>
+          <a:ext cx="0" cy="0"/>
+          <a:chOff x="0" y="0"/>
+          <a:chExt cx="0" cy="0"/>
+        </a:xfrm>
+      </p:grpSpPr>
+      <p:sp>
+        <p:nvSpPr>
+          <p:cNvPr id="2" name="Title 1">
+            <a:extLst>
+              <a:ext uri="{FF2B5EF4-FFF2-40B4-BE49-F238E27FC236}">
+                <a16:creationId xmlns:a16="http://schemas.microsoft.com/office/drawing/2014/main" id="{4670D689-3296-CB63-D2DD-54C73FABCED3}"/>
+              </a:ext>
+            </a:extLst>
+          </p:cNvPr>
+          <p:cNvSpPr>
+            <a:spLocks noGrp="1"/>
+          </p:cNvSpPr>
+          <p:nvPr>
+            <p:ph type="title"/>
+          </p:nvPr>
+        </p:nvSpPr>
+        <p:spPr/>
+        <p:txBody>
+          <a:bodyPr/>
+          <a:lstStyle/>
+          <a:p>
+            <a:r>
+              <a:rPr lang="en-US" dirty="0">
+                <a:latin typeface="Calibri" panose="020F0502020204030204" pitchFamily="34" charset="0"/>
+                <a:ea typeface="Calibri" panose="020F0502020204030204" pitchFamily="34" charset="0"/>
+                <a:cs typeface="Calibri" panose="020F0502020204030204" pitchFamily="34" charset="0"/>
+              </a:rPr>
+              <a:t>Slide title</a:t>
+            </a:r>
+          </a:p>
+        </p:txBody>
+      </p:sp>
+      <p:graphicFrame>
+        <p:nvGraphicFramePr>
+          <p:cNvPr id="7" name="Content Placeholder 6">
+            <a:extLst>
+              <a:ext uri="{FF2B5EF4-FFF2-40B4-BE49-F238E27FC236}">
+                <a16:creationId xmlns:a16="http://schemas.microsoft.com/office/drawing/2014/main" id="{37FDEE5C-AF65-3FC3-1258-D71A13C03166}"/>
+              </a:ext>
+            </a:extLst>
+          </p:cNvPr>
+          <p:cNvGraphicFramePr>
+            <a:graphicFrameLocks noGrp="1"/>
+          </p:cNvGraphicFramePr>
+          <p:nvPr>
+            <p:ph idx="1"/>
+            <p:extLst>
+              <p:ext uri="{D42A27DB-BD31-4B8C-83A1-F6EECF244321}">
+                <p14:modId xmlns:p14="http://schemas.microsoft.com/office/powerpoint/2010/main" val="1953683222"/>
+              </p:ext>
+            </p:extLst>
+          </p:nvPr>
+        </p:nvGraphicFramePr>
+        <p:xfrm>
+          <a:off x="838200" y="1825625"/>
+          <a:ext cx="8127999" cy="741680"/>
+        </p:xfrm>
+        <a:graphic>
+          <a:graphicData uri="http://schemas.openxmlformats.org/drawingml/2006/table">
+            <a:tbl>
+              <a:tblPr firstRow="1" bandRow="1">
+                <a:tableStyleId>{5C22544A-7EE6-4342-B048-85BDC9FD1C3A}</a:tableStyleId>
+              </a:tblPr>
+              <a:tblGrid>
+                <a:gridCol w="2709333">
+                  <a:extLst>
+                    <a:ext uri="{9D8B030D-6E8A-4147-A177-3AD203B41FA5}">
+                      <a16:colId xmlns:a16="http://schemas.microsoft.com/office/drawing/2014/main" val="2037353830"/>
+                    </a:ext>
+                  </a:extLst>
+                </a:gridCol>
+                <a:gridCol w="2709333">
+                  <a:extLst>
+                    <a:ext uri="{9D8B030D-6E8A-4147-A177-3AD203B41FA5}">
+                      <a16:colId xmlns:a16="http://schemas.microsoft.com/office/drawing/2014/main" val="1602756099"/>
+                    </a:ext>
+                  </a:extLst>
+                </a:gridCol>
+                <a:gridCol w="2709333">
+                  <a:extLst>
+                    <a:ext uri="{9D8B030D-6E8A-4147-A177-3AD203B41FA5}">
+                      <a16:colId xmlns:a16="http://schemas.microsoft.com/office/drawing/2014/main" val="1696144579"/>
+                    </a:ext>
+                  </a:extLst>
+                </a:gridCol>
+              </a:tblGrid>
+              <a:tr h="370840">
+                <a:tc>
+                  <a:txBody>
+                    <a:bodyPr/>
+                    <a:lstStyle/>
+                    <a:p>
+                      <a:r>
+                        <a:rPr lang="en-US" dirty="0"/>
+                        <a:t>Test table</a:t>
+                      </a:r>
+                    </a:p>
+                  </a:txBody>
+                  <a:tcPr/>
+                </a:tc>
+                <a:tc>
+                  <a:txBody>
+                    <a:bodyPr/>
+                    <a:lstStyle/>
+                    <a:p>
+                      <a:r>
+                        <a:rPr lang="en-US" dirty="0"/>
+                        <a:t>Names</a:t>
+                      </a:r>
+                    </a:p>
+                  </a:txBody>
+                  <a:tcPr/>
+                </a:tc>
+                <a:tc>
+                  <a:txBody>
+                    <a:bodyPr/>
+                    <a:lstStyle/>
+                    <a:p>
+                      <a:r>
+                        <a:rPr lang="en-US" dirty="0"/>
+                        <a:t>Emails</a:t>
+                      </a:r>
+                    </a:p>
+                  </a:txBody>
+                  <a:tcPr/>
+                </a:tc>
+                <a:extLst>
+                  <a:ext uri="{0D108BD9-81ED-4DB2-BD59-A6C34878D82A}">
+                    <a16:rowId xmlns:a16="http://schemas.microsoft.com/office/drawing/2014/main" val="2653367512"/>
+                  </a:ext>
+                </a:extLst>
+              </a:tr>
+              <a:tr h="370840">
+                <a:tc>
+                  <a:txBody>
+                    <a:bodyPr/>
+                    <a:lstStyle/>
+                    <a:p>
+                      <a:endParaRPr lang="en-US" dirty="0"/>
+                    </a:p>
+                  </a:txBody>
+                  <a:tcPr/>
+                </a:tc>
+                <a:tc>
+                  <a:txBody>
+                    <a:bodyPr/>
+                    <a:lstStyle/>
+                    <a:p>
+                      <a:pPr marL="0" marR="0" lvl="0" indent="0" algn="l" defTabSz="914400" rtl="0" eaLnBrk="1" fontAlgn="auto" latinLnBrk="0" hangingPunct="1">
+                        <a:lnSpc>
+                          <a:spcPct val="100000"/>
+                        </a:lnSpc>
+                        <a:spcBef>
+                          <a:spcPts val="0"/>
+                        </a:spcBef>
+                        <a:spcAft>
+                          <a:spcPts val="0"/>
+                        </a:spcAft>
+                        <a:buClrTx/>
+                        <a:buSzTx/>
+                        <a:buFontTx/>
+                        <a:buNone/>
+                        <a:tabLst/>
+                        <a:defRPr/>
+                      </a:pPr>
+                      <a:r>
+                        <a:rPr lang="en-US" dirty="0"/>
+                        <a:t>{{ program.users.name }}</a:t>
+                      </a:r>
+                    </a:p>
+                  </a:txBody>
+                  <a:tcPr/>
+                </a:tc>
+                <a:tc>
+                  <a:txBody>
+                    <a:bodyPr/>
+                    <a:lstStyle/>
+                    <a:p>
+                      <a:pPr marL="0" marR="0" lvl="0" indent="0" algn="l" defTabSz="914400" rtl="0" eaLnBrk="1" fontAlgn="auto" latinLnBrk="0" hangingPunct="1">
+                        <a:lnSpc>
+                          <a:spcPct val="100000"/>
+                        </a:lnSpc>
+                        <a:spcBef>
+                          <a:spcPts val="0"/>
+                        </a:spcBef>
+                        <a:spcAft>
+                          <a:spcPts val="0"/>
+                        </a:spcAft>
+                        <a:buClrTx/>
+                        <a:buSzTx/>
+                        <a:buFontTx/>
+                        <a:buNone/>
+                        <a:tabLst/>
+                        <a:defRPr/>
+                      </a:pPr>
+                      <a:r>
+                        <a:rPr lang="en-US" dirty="0"/>
+                        <a:t>{{ </a:t>
+                      </a:r>
+                      <a:r>
+                        <a:rPr lang="en-US" dirty="0" err="1"/>
+                        <a:t>program.users.email</a:t>
+                      </a:r>
+                      <a:r>
+                        <a:rPr lang="en-US" dirty="0"/>
+                        <a:t> }}</a:t>
+                      </a:r>
+                    </a:p>
+                  </a:txBody>
+                  <a:tcPr/>
+                </a:tc>
+                <a:extLst>
+                  <a:ext uri="{0D108BD9-81ED-4DB2-BD59-A6C34878D82A}">
+                    <a16:rowId xmlns:a16="http://schemas.microsoft.com/office/drawing/2014/main" val="1173098446"/>
+                  </a:ext>
+                </a:extLst>
+              </a:tr>
+            </a:tbl>
+          </a:graphicData>
+        </a:graphic>
+      </p:graphicFrame>
+    </p:spTree>
+    <p:extLst>
+      <p:ext uri="{BB962C8B-B14F-4D97-AF65-F5344CB8AC3E}">
+        <p14:creationId xmlns:p14="http://schemas.microsoft.com/office/powerpoint/2010/main" val="2773459250"/>
+      </p:ext>
+    </p:extLst>
+  </p:cSld>
+  <p:clrMapOvr>
+    <a:masterClrMapping/>
+  </p:clrMapOvr>
+</p:sld>
+</file>
+
+<file path=ppt/slides/slide5.xml><?xml version="1.0" encoding="utf-8"?>
+<p:sld xmlns:a="http://schemas.openxmlformats.org/drawingml/2006/main" xmlns:r="http://schemas.openxmlformats.org/officeDocument/2006/relationships" xmlns:p="http://schemas.openxmlformats.org/presentationml/2006/main">
+  <p:cSld>
+    <p:spTree>
+      <p:nvGrpSpPr>
         <p:cNvPr id="1" name=""/>
         <p:cNvGrpSpPr/>
         <p:nvPr/>

</xml_diff>